<commit_message>
feature/#issue62. Updated presenter notes.
</commit_message>
<xml_diff>
--- a/docs/presentation/GroupStudy-presentation - kirill.pptx
+++ b/docs/presentation/GroupStudy-presentation - kirill.pptx
@@ -484,6 +484,1810 @@
     </a:lvl9pPr>
   </p:notesStyle>
 </p:notesMaster>
+</file>
+
+<file path=ppt/notesSlides/notesSlide1.xml><?xml version="1.0" encoding="utf-8"?>
+<p:notes xmlns:a="http://schemas.openxmlformats.org/drawingml/2006/main" xmlns:r="http://schemas.openxmlformats.org/officeDocument/2006/relationships" xmlns:p="http://schemas.openxmlformats.org/presentationml/2006/main">
+  <p:cSld>
+    <p:spTree>
+      <p:nvGrpSpPr>
+        <p:cNvPr id="1" name=""/>
+        <p:cNvGrpSpPr/>
+        <p:nvPr/>
+      </p:nvGrpSpPr>
+      <p:grpSpPr>
+        <a:xfrm>
+          <a:off x="0" y="0"/>
+          <a:ext cx="0" cy="0"/>
+          <a:chOff x="0" y="0"/>
+          <a:chExt cx="0" cy="0"/>
+        </a:xfrm>
+      </p:grpSpPr>
+      <p:sp>
+        <p:nvSpPr>
+          <p:cNvPr id="2" name="Образ слайда 1"/>
+          <p:cNvSpPr>
+            <a:spLocks noGrp="1" noRot="1" noChangeAspect="1"/>
+          </p:cNvSpPr>
+          <p:nvPr>
+            <p:ph type="sldImg"/>
+          </p:nvPr>
+        </p:nvSpPr>
+        <p:spPr/>
+      </p:sp>
+      <p:sp>
+        <p:nvSpPr>
+          <p:cNvPr id="3" name="Заметки 2"/>
+          <p:cNvSpPr>
+            <a:spLocks noGrp="1"/>
+          </p:cNvSpPr>
+          <p:nvPr>
+            <p:ph type="body" idx="1"/>
+          </p:nvPr>
+        </p:nvSpPr>
+        <p:spPr/>
+        <p:txBody>
+          <a:bodyPr/>
+          <a:lstStyle/>
+          <a:p>
+            <a:r>
+              <a:rPr lang="en-US" dirty="0" smtClean="0"/>
+              <a:t>Now we will discuss the most visual part of our framework – </a:t>
+            </a:r>
+            <a:r>
+              <a:rPr lang="en-US" dirty="0" err="1" smtClean="0"/>
+              <a:t>GPS_Frontend</a:t>
+            </a:r>
+            <a:r>
+              <a:rPr lang="en-US" dirty="0" smtClean="0"/>
+              <a:t>.</a:t>
+            </a:r>
+          </a:p>
+          <a:p>
+            <a:endParaRPr lang="en-US" dirty="0" smtClean="0"/>
+          </a:p>
+          <a:p>
+            <a:r>
+              <a:rPr lang="en-US" dirty="0" smtClean="0"/>
+              <a:t>This is a web based user interface</a:t>
+            </a:r>
+            <a:r>
+              <a:rPr lang="en-US" baseline="0" dirty="0" smtClean="0"/>
+              <a:t> to access link measurement data from mobile phones. Also it provides functions to run optimization tasks and analyze result of them.</a:t>
+            </a:r>
+            <a:endParaRPr lang="ru-RU" baseline="0" dirty="0" smtClean="0"/>
+          </a:p>
+          <a:p>
+            <a:endParaRPr lang="en-US" baseline="0" dirty="0" smtClean="0"/>
+          </a:p>
+          <a:p>
+            <a:r>
+              <a:rPr lang="en-US" baseline="0" dirty="0" smtClean="0"/>
+              <a:t>User Interface built with Model-View-</a:t>
+            </a:r>
+            <a:r>
+              <a:rPr lang="en-US" baseline="0" dirty="0" err="1" smtClean="0"/>
+              <a:t>ViewModel</a:t>
+            </a:r>
+            <a:r>
+              <a:rPr lang="en-US" baseline="0" dirty="0" smtClean="0"/>
+              <a:t> design pattern shown on the slide.</a:t>
+            </a:r>
+          </a:p>
+          <a:p>
+            <a:endParaRPr lang="en-US" baseline="0" dirty="0" smtClean="0"/>
+          </a:p>
+          <a:p>
+            <a:r>
+              <a:rPr lang="en-US" baseline="0" dirty="0" smtClean="0"/>
+              <a:t>Here we have three components:</a:t>
+            </a:r>
+          </a:p>
+          <a:p>
+            <a:endParaRPr lang="en-US" baseline="0" dirty="0" smtClean="0"/>
+          </a:p>
+          <a:p>
+            <a:pPr marL="171450" indent="-171450">
+              <a:buFontTx/>
+              <a:buChar char="-"/>
+            </a:pPr>
+            <a:r>
+              <a:rPr lang="en-US" baseline="0" dirty="0" smtClean="0"/>
+              <a:t>View – objects shown to user, like tables, div, columns, images.</a:t>
+            </a:r>
+          </a:p>
+          <a:p>
+            <a:pPr marL="171450" indent="-171450">
+              <a:buFontTx/>
+              <a:buChar char="-"/>
+            </a:pPr>
+            <a:r>
+              <a:rPr lang="en-US" baseline="0" dirty="0" err="1" smtClean="0"/>
+              <a:t>ViewModel</a:t>
+            </a:r>
+            <a:r>
+              <a:rPr lang="en-US" baseline="0" dirty="0" smtClean="0"/>
+              <a:t> – component that defines operation on data representing in Model. May separate partly data contract with Model component.</a:t>
+            </a:r>
+          </a:p>
+          <a:p>
+            <a:pPr marL="171450" indent="-171450">
+              <a:buFontTx/>
+              <a:buChar char="-"/>
+            </a:pPr>
+            <a:r>
+              <a:rPr lang="en-US" baseline="0" dirty="0" smtClean="0"/>
+              <a:t>Model – storage for user data. There are specified getters and setters for data objects. All data sink communication (to external DB, local DB, different transformation) defined here.</a:t>
+            </a:r>
+            <a:endParaRPr lang="ru-RU" baseline="0" dirty="0" smtClean="0"/>
+          </a:p>
+        </p:txBody>
+      </p:sp>
+      <p:sp>
+        <p:nvSpPr>
+          <p:cNvPr id="4" name="Номер слайда 3"/>
+          <p:cNvSpPr>
+            <a:spLocks noGrp="1"/>
+          </p:cNvSpPr>
+          <p:nvPr>
+            <p:ph type="sldNum" sz="quarter" idx="10"/>
+          </p:nvPr>
+        </p:nvSpPr>
+        <p:spPr/>
+        <p:txBody>
+          <a:bodyPr/>
+          <a:lstStyle/>
+          <a:p>
+            <a:fld id="{B274066A-D326-41ED-8B87-404DACE06210}" type="slidenum">
+              <a:rPr lang="de-DE" smtClean="0"/>
+              <a:t>1</a:t>
+            </a:fld>
+            <a:endParaRPr lang="de-DE"/>
+          </a:p>
+        </p:txBody>
+      </p:sp>
+    </p:spTree>
+    <p:extLst>
+      <p:ext uri="{BB962C8B-B14F-4D97-AF65-F5344CB8AC3E}">
+        <p14:creationId xmlns:p14="http://schemas.microsoft.com/office/powerpoint/2010/main" val="1549006359"/>
+      </p:ext>
+    </p:extLst>
+  </p:cSld>
+  <p:clrMapOvr>
+    <a:masterClrMapping/>
+  </p:clrMapOvr>
+</p:notes>
+</file>
+
+<file path=ppt/notesSlides/notesSlide10.xml><?xml version="1.0" encoding="utf-8"?>
+<p:notes xmlns:a="http://schemas.openxmlformats.org/drawingml/2006/main" xmlns:r="http://schemas.openxmlformats.org/officeDocument/2006/relationships" xmlns:p="http://schemas.openxmlformats.org/presentationml/2006/main">
+  <p:cSld>
+    <p:spTree>
+      <p:nvGrpSpPr>
+        <p:cNvPr id="1" name=""/>
+        <p:cNvGrpSpPr/>
+        <p:nvPr/>
+      </p:nvGrpSpPr>
+      <p:grpSpPr>
+        <a:xfrm>
+          <a:off x="0" y="0"/>
+          <a:ext cx="0" cy="0"/>
+          <a:chOff x="0" y="0"/>
+          <a:chExt cx="0" cy="0"/>
+        </a:xfrm>
+      </p:grpSpPr>
+      <p:sp>
+        <p:nvSpPr>
+          <p:cNvPr id="2" name="Образ слайда 1"/>
+          <p:cNvSpPr>
+            <a:spLocks noGrp="1" noRot="1" noChangeAspect="1"/>
+          </p:cNvSpPr>
+          <p:nvPr>
+            <p:ph type="sldImg"/>
+          </p:nvPr>
+        </p:nvSpPr>
+        <p:spPr/>
+      </p:sp>
+      <p:sp>
+        <p:nvSpPr>
+          <p:cNvPr id="3" name="Заметки 2"/>
+          <p:cNvSpPr>
+            <a:spLocks noGrp="1"/>
+          </p:cNvSpPr>
+          <p:nvPr>
+            <p:ph type="body" idx="1"/>
+          </p:nvPr>
+        </p:nvSpPr>
+        <p:spPr/>
+        <p:txBody>
+          <a:bodyPr/>
+          <a:lstStyle/>
+          <a:p>
+            <a:r>
+              <a:rPr lang="en-US" dirty="0" smtClean="0"/>
+              <a:t>Finally, you can see deployment plan using containers.</a:t>
+            </a:r>
+          </a:p>
+          <a:p>
+            <a:endParaRPr lang="en-US" dirty="0" smtClean="0"/>
+          </a:p>
+          <a:p>
+            <a:r>
+              <a:rPr lang="en-US" dirty="0" smtClean="0"/>
+              <a:t>We have three entry points:</a:t>
+            </a:r>
+          </a:p>
+          <a:p>
+            <a:endParaRPr lang="en-US" dirty="0" smtClean="0"/>
+          </a:p>
+          <a:p>
+            <a:r>
+              <a:rPr lang="en-US" baseline="0" dirty="0" err="1" smtClean="0"/>
+              <a:t>Tcp</a:t>
+            </a:r>
+            <a:r>
+              <a:rPr lang="en-US" baseline="0" dirty="0" smtClean="0"/>
+              <a:t>  80/443 – to access web interface.</a:t>
+            </a:r>
+          </a:p>
+          <a:p>
+            <a:r>
+              <a:rPr lang="en-US" dirty="0" err="1" smtClean="0"/>
+              <a:t>Tcp</a:t>
+            </a:r>
+            <a:r>
+              <a:rPr lang="en-US" dirty="0" smtClean="0"/>
+              <a:t>  5000 –</a:t>
+            </a:r>
+            <a:r>
+              <a:rPr lang="en-US" baseline="0" dirty="0" smtClean="0"/>
+              <a:t> to access REST API</a:t>
+            </a:r>
+          </a:p>
+          <a:p>
+            <a:r>
+              <a:rPr lang="en-US" baseline="0" dirty="0" err="1" smtClean="0"/>
+              <a:t>Tcp</a:t>
+            </a:r>
+            <a:r>
+              <a:rPr lang="en-US" baseline="0" dirty="0" smtClean="0"/>
+              <a:t> 21 – to access FTP to perform link throughput measurements</a:t>
+            </a:r>
+          </a:p>
+          <a:p>
+            <a:endParaRPr lang="en-US" baseline="0" dirty="0" smtClean="0"/>
+          </a:p>
+          <a:p>
+            <a:r>
+              <a:rPr lang="en-US" baseline="0" dirty="0" smtClean="0"/>
+              <a:t>Internally, Docker (a set of platform to run OS-level virtualization – container) set-up overlay network  for containers and take care of correct routing between them. Therefore, as long as your containers are running in the same machine or cluster, you don’t have to worry about </a:t>
+            </a:r>
+            <a:r>
+              <a:rPr lang="en-US" baseline="0" smtClean="0"/>
+              <a:t>network connectivity.</a:t>
+            </a:r>
+            <a:endParaRPr lang="en-US" dirty="0"/>
+          </a:p>
+        </p:txBody>
+      </p:sp>
+      <p:sp>
+        <p:nvSpPr>
+          <p:cNvPr id="4" name="Номер слайда 3"/>
+          <p:cNvSpPr>
+            <a:spLocks noGrp="1"/>
+          </p:cNvSpPr>
+          <p:nvPr>
+            <p:ph type="sldNum" sz="quarter" idx="10"/>
+          </p:nvPr>
+        </p:nvSpPr>
+        <p:spPr/>
+        <p:txBody>
+          <a:bodyPr/>
+          <a:lstStyle/>
+          <a:p>
+            <a:fld id="{B274066A-D326-41ED-8B87-404DACE06210}" type="slidenum">
+              <a:rPr lang="de-DE" smtClean="0"/>
+              <a:t>10</a:t>
+            </a:fld>
+            <a:endParaRPr lang="de-DE"/>
+          </a:p>
+        </p:txBody>
+      </p:sp>
+    </p:spTree>
+    <p:extLst>
+      <p:ext uri="{BB962C8B-B14F-4D97-AF65-F5344CB8AC3E}">
+        <p14:creationId xmlns:p14="http://schemas.microsoft.com/office/powerpoint/2010/main" val="2016645991"/>
+      </p:ext>
+    </p:extLst>
+  </p:cSld>
+  <p:clrMapOvr>
+    <a:masterClrMapping/>
+  </p:clrMapOvr>
+</p:notes>
+</file>
+
+<file path=ppt/notesSlides/notesSlide2.xml><?xml version="1.0" encoding="utf-8"?>
+<p:notes xmlns:a="http://schemas.openxmlformats.org/drawingml/2006/main" xmlns:r="http://schemas.openxmlformats.org/officeDocument/2006/relationships" xmlns:p="http://schemas.openxmlformats.org/presentationml/2006/main">
+  <p:cSld>
+    <p:spTree>
+      <p:nvGrpSpPr>
+        <p:cNvPr id="1" name=""/>
+        <p:cNvGrpSpPr/>
+        <p:nvPr/>
+      </p:nvGrpSpPr>
+      <p:grpSpPr>
+        <a:xfrm>
+          <a:off x="0" y="0"/>
+          <a:ext cx="0" cy="0"/>
+          <a:chOff x="0" y="0"/>
+          <a:chExt cx="0" cy="0"/>
+        </a:xfrm>
+      </p:grpSpPr>
+      <p:sp>
+        <p:nvSpPr>
+          <p:cNvPr id="2" name="Образ слайда 1"/>
+          <p:cNvSpPr>
+            <a:spLocks noGrp="1" noRot="1" noChangeAspect="1"/>
+          </p:cNvSpPr>
+          <p:nvPr>
+            <p:ph type="sldImg"/>
+          </p:nvPr>
+        </p:nvSpPr>
+        <p:spPr/>
+      </p:sp>
+      <p:sp>
+        <p:nvSpPr>
+          <p:cNvPr id="3" name="Заметки 2"/>
+          <p:cNvSpPr>
+            <a:spLocks noGrp="1"/>
+          </p:cNvSpPr>
+          <p:nvPr>
+            <p:ph type="body" idx="1"/>
+          </p:nvPr>
+        </p:nvSpPr>
+        <p:spPr/>
+        <p:txBody>
+          <a:bodyPr/>
+          <a:lstStyle/>
+          <a:p>
+            <a:r>
+              <a:rPr lang="en-US" dirty="0" smtClean="0"/>
+              <a:t>We</a:t>
+            </a:r>
+            <a:r>
+              <a:rPr lang="en-US" baseline="0" dirty="0" smtClean="0"/>
+              <a:t> can point out 5 technologies in </a:t>
+            </a:r>
+            <a:r>
+              <a:rPr lang="en-US" baseline="0" dirty="0" err="1" smtClean="0"/>
+              <a:t>GPS_Frontend</a:t>
+            </a:r>
+            <a:endParaRPr lang="en-US" baseline="0" dirty="0" smtClean="0"/>
+          </a:p>
+          <a:p>
+            <a:endParaRPr lang="en-US" baseline="0" dirty="0" smtClean="0"/>
+          </a:p>
+          <a:p>
+            <a:r>
+              <a:rPr lang="en-US" sz="1200" b="0" kern="1200" dirty="0" smtClean="0">
+                <a:solidFill>
+                  <a:schemeClr val="tx1"/>
+                </a:solidFill>
+                <a:effectLst/>
+                <a:latin typeface="+mn-lt"/>
+                <a:ea typeface="+mn-ea"/>
+                <a:cs typeface="+mn-cs"/>
+              </a:rPr>
+              <a:t>- </a:t>
+            </a:r>
+            <a:r>
+              <a:rPr lang="en-US" sz="1200" b="0" kern="1200" dirty="0" err="1" smtClean="0">
+                <a:solidFill>
+                  <a:schemeClr val="tx1"/>
+                </a:solidFill>
+                <a:effectLst/>
+                <a:latin typeface="+mn-lt"/>
+                <a:ea typeface="+mn-ea"/>
+                <a:cs typeface="+mn-cs"/>
+              </a:rPr>
+              <a:t>VueJS</a:t>
+            </a:r>
+            <a:r>
+              <a:rPr lang="en-US" sz="1200" b="0" kern="1200" dirty="0" smtClean="0">
+                <a:solidFill>
+                  <a:schemeClr val="tx1"/>
+                </a:solidFill>
+                <a:effectLst/>
+                <a:latin typeface="+mn-lt"/>
+                <a:ea typeface="+mn-ea"/>
+                <a:cs typeface="+mn-cs"/>
+              </a:rPr>
+              <a:t> - a </a:t>
+            </a:r>
+            <a:r>
+              <a:rPr lang="en-US" sz="1200" b="0" kern="1200" dirty="0" err="1" smtClean="0">
+                <a:solidFill>
+                  <a:schemeClr val="tx1"/>
+                </a:solidFill>
+                <a:effectLst/>
+                <a:latin typeface="+mn-lt"/>
+                <a:ea typeface="+mn-ea"/>
+                <a:cs typeface="+mn-cs"/>
+              </a:rPr>
+              <a:t>Javascript</a:t>
+            </a:r>
+            <a:r>
+              <a:rPr lang="en-US" sz="1200" b="0" kern="1200" dirty="0" smtClean="0">
+                <a:solidFill>
+                  <a:schemeClr val="tx1"/>
+                </a:solidFill>
+                <a:effectLst/>
+                <a:latin typeface="+mn-lt"/>
+                <a:ea typeface="+mn-ea"/>
+                <a:cs typeface="+mn-cs"/>
+              </a:rPr>
+              <a:t> web framework, the skeleton of application</a:t>
+            </a:r>
+          </a:p>
+          <a:p>
+            <a:r>
+              <a:rPr lang="en-US" sz="1200" b="0" kern="1200" dirty="0" smtClean="0">
+                <a:solidFill>
+                  <a:schemeClr val="tx1"/>
+                </a:solidFill>
+                <a:effectLst/>
+                <a:latin typeface="+mn-lt"/>
+                <a:ea typeface="+mn-ea"/>
+                <a:cs typeface="+mn-cs"/>
+              </a:rPr>
+              <a:t>- </a:t>
+            </a:r>
+            <a:r>
+              <a:rPr lang="en-US" sz="1200" b="0" kern="1200" dirty="0" err="1" smtClean="0">
+                <a:solidFill>
+                  <a:schemeClr val="tx1"/>
+                </a:solidFill>
+                <a:effectLst/>
+                <a:latin typeface="+mn-lt"/>
+                <a:ea typeface="+mn-ea"/>
+                <a:cs typeface="+mn-cs"/>
+              </a:rPr>
+              <a:t>Vuex</a:t>
+            </a:r>
+            <a:r>
+              <a:rPr lang="en-US" sz="1200" b="0" kern="1200" dirty="0" smtClean="0">
+                <a:solidFill>
+                  <a:schemeClr val="tx1"/>
+                </a:solidFill>
+                <a:effectLst/>
+                <a:latin typeface="+mn-lt"/>
+                <a:ea typeface="+mn-ea"/>
+                <a:cs typeface="+mn-cs"/>
+              </a:rPr>
+              <a:t> - a unite data storage to share between components</a:t>
+            </a:r>
+          </a:p>
+          <a:p>
+            <a:r>
+              <a:rPr lang="en-US" sz="1200" b="0" kern="1200" dirty="0" smtClean="0">
+                <a:solidFill>
+                  <a:schemeClr val="tx1"/>
+                </a:solidFill>
+                <a:effectLst/>
+                <a:latin typeface="+mn-lt"/>
+                <a:ea typeface="+mn-ea"/>
+                <a:cs typeface="+mn-cs"/>
+              </a:rPr>
+              <a:t>- </a:t>
+            </a:r>
+            <a:r>
+              <a:rPr lang="en-US" sz="1200" b="0" kern="1200" dirty="0" err="1" smtClean="0">
+                <a:solidFill>
+                  <a:schemeClr val="tx1"/>
+                </a:solidFill>
+                <a:effectLst/>
+                <a:latin typeface="+mn-lt"/>
+                <a:ea typeface="+mn-ea"/>
+                <a:cs typeface="+mn-cs"/>
+              </a:rPr>
+              <a:t>Vuerouter</a:t>
+            </a:r>
+            <a:r>
+              <a:rPr lang="en-US" sz="1200" b="0" kern="1200" dirty="0" smtClean="0">
+                <a:solidFill>
+                  <a:schemeClr val="tx1"/>
+                </a:solidFill>
+                <a:effectLst/>
+                <a:latin typeface="+mn-lt"/>
+                <a:ea typeface="+mn-ea"/>
+                <a:cs typeface="+mn-cs"/>
+              </a:rPr>
+              <a:t> - URL path routing</a:t>
+            </a:r>
+          </a:p>
+          <a:p>
+            <a:r>
+              <a:rPr lang="en-US" sz="1200" b="0" kern="1200" dirty="0" smtClean="0">
+                <a:solidFill>
+                  <a:schemeClr val="tx1"/>
+                </a:solidFill>
+                <a:effectLst/>
+                <a:latin typeface="+mn-lt"/>
+                <a:ea typeface="+mn-ea"/>
+                <a:cs typeface="+mn-cs"/>
+              </a:rPr>
+              <a:t>- </a:t>
+            </a:r>
+            <a:r>
+              <a:rPr lang="en-US" sz="1200" b="0" kern="1200" dirty="0" err="1" smtClean="0">
+                <a:solidFill>
+                  <a:schemeClr val="tx1"/>
+                </a:solidFill>
+                <a:effectLst/>
+                <a:latin typeface="+mn-lt"/>
+                <a:ea typeface="+mn-ea"/>
+                <a:cs typeface="+mn-cs"/>
+              </a:rPr>
+              <a:t>Plotly</a:t>
+            </a:r>
+            <a:r>
+              <a:rPr lang="en-US" sz="1200" b="0" kern="1200" dirty="0" smtClean="0">
+                <a:solidFill>
+                  <a:schemeClr val="tx1"/>
+                </a:solidFill>
+                <a:effectLst/>
+                <a:latin typeface="+mn-lt"/>
+                <a:ea typeface="+mn-ea"/>
+                <a:cs typeface="+mn-cs"/>
+              </a:rPr>
+              <a:t> - to plot figures</a:t>
+            </a:r>
+          </a:p>
+          <a:p>
+            <a:r>
+              <a:rPr lang="en-US" sz="1200" b="0" kern="1200" dirty="0" smtClean="0">
+                <a:solidFill>
+                  <a:schemeClr val="tx1"/>
+                </a:solidFill>
+                <a:effectLst/>
+                <a:latin typeface="+mn-lt"/>
+                <a:ea typeface="+mn-ea"/>
+                <a:cs typeface="+mn-cs"/>
+              </a:rPr>
+              <a:t>- Bootstrap - an open-source </a:t>
+            </a:r>
+            <a:r>
+              <a:rPr lang="en-US" sz="1200" b="0" kern="1200" dirty="0" err="1" smtClean="0">
+                <a:solidFill>
+                  <a:schemeClr val="tx1"/>
+                </a:solidFill>
+                <a:effectLst/>
+                <a:latin typeface="+mn-lt"/>
+                <a:ea typeface="+mn-ea"/>
+                <a:cs typeface="+mn-cs"/>
+              </a:rPr>
+              <a:t>toolkip</a:t>
+            </a:r>
+            <a:r>
+              <a:rPr lang="en-US" sz="1200" b="0" kern="1200" dirty="0" smtClean="0">
+                <a:solidFill>
+                  <a:schemeClr val="tx1"/>
+                </a:solidFill>
+                <a:effectLst/>
+                <a:latin typeface="+mn-lt"/>
+                <a:ea typeface="+mn-ea"/>
+                <a:cs typeface="+mn-cs"/>
+              </a:rPr>
+              <a:t>, to make UI good looking.</a:t>
+            </a:r>
+          </a:p>
+          <a:p>
+            <a:endParaRPr lang="en-US" dirty="0" smtClean="0"/>
+          </a:p>
+          <a:p>
+            <a:endParaRPr lang="en-US" dirty="0" smtClean="0"/>
+          </a:p>
+          <a:p>
+            <a:r>
+              <a:rPr lang="en-US" sz="1200" b="0" kern="1200" dirty="0" smtClean="0">
+                <a:solidFill>
+                  <a:schemeClr val="tx1"/>
+                </a:solidFill>
+                <a:effectLst/>
+                <a:latin typeface="+mn-lt"/>
+                <a:ea typeface="+mn-ea"/>
+                <a:cs typeface="+mn-cs"/>
+              </a:rPr>
+              <a:t>- Angular has rich functionality, but too complex for that task.</a:t>
+            </a:r>
+          </a:p>
+          <a:p>
+            <a:r>
+              <a:rPr lang="en-US" sz="1200" b="0" kern="1200" dirty="0" smtClean="0">
+                <a:solidFill>
+                  <a:schemeClr val="tx1"/>
+                </a:solidFill>
+                <a:effectLst/>
+                <a:latin typeface="+mn-lt"/>
+                <a:ea typeface="+mn-ea"/>
+                <a:cs typeface="+mn-cs"/>
+              </a:rPr>
+              <a:t>- React is more </a:t>
+            </a:r>
+            <a:r>
+              <a:rPr lang="en-US" sz="1200" b="0" kern="1200" dirty="0" err="1" smtClean="0">
+                <a:solidFill>
+                  <a:schemeClr val="tx1"/>
+                </a:solidFill>
+                <a:effectLst/>
+                <a:latin typeface="+mn-lt"/>
+                <a:ea typeface="+mn-ea"/>
+                <a:cs typeface="+mn-cs"/>
+              </a:rPr>
+              <a:t>fexible</a:t>
+            </a:r>
+            <a:r>
+              <a:rPr lang="en-US" sz="1200" b="0" kern="1200" dirty="0" smtClean="0">
+                <a:solidFill>
+                  <a:schemeClr val="tx1"/>
+                </a:solidFill>
+                <a:effectLst/>
+                <a:latin typeface="+mn-lt"/>
+                <a:ea typeface="+mn-ea"/>
+                <a:cs typeface="+mn-cs"/>
+              </a:rPr>
+              <a:t>, but requires more time to get working in.</a:t>
+            </a:r>
+          </a:p>
+          <a:p>
+            <a:r>
+              <a:rPr lang="en-US" sz="1200" b="0" kern="1200" dirty="0" smtClean="0">
+                <a:solidFill>
+                  <a:schemeClr val="tx1"/>
+                </a:solidFill>
+                <a:effectLst/>
+                <a:latin typeface="+mn-lt"/>
+                <a:ea typeface="+mn-ea"/>
+                <a:cs typeface="+mn-cs"/>
+              </a:rPr>
+              <a:t>- Vue.js is a simple framework with an excellent documentation but has a lack of components in the default con</a:t>
+            </a:r>
+            <a:r>
+              <a:rPr lang="en-US" sz="1200" b="0" kern="1200" dirty="0" err="1" smtClean="0">
+                <a:solidFill>
+                  <a:schemeClr val="tx1"/>
+                </a:solidFill>
+                <a:effectLst/>
+                <a:latin typeface="+mn-lt"/>
+                <a:ea typeface="+mn-ea"/>
+                <a:cs typeface="+mn-cs"/>
+              </a:rPr>
+              <a:t>guration</a:t>
+            </a:r>
+            <a:r>
+              <a:rPr lang="en-US" sz="1200" b="0" kern="1200" dirty="0" smtClean="0">
+                <a:solidFill>
+                  <a:schemeClr val="tx1"/>
+                </a:solidFill>
+                <a:effectLst/>
+                <a:latin typeface="+mn-lt"/>
+                <a:ea typeface="+mn-ea"/>
+                <a:cs typeface="+mn-cs"/>
+              </a:rPr>
+              <a:t>. It requires additional libraries and components to design required functions.</a:t>
+            </a:r>
+          </a:p>
+          <a:p>
+            <a:endParaRPr lang="en-US" dirty="0"/>
+          </a:p>
+        </p:txBody>
+      </p:sp>
+      <p:sp>
+        <p:nvSpPr>
+          <p:cNvPr id="4" name="Номер слайда 3"/>
+          <p:cNvSpPr>
+            <a:spLocks noGrp="1"/>
+          </p:cNvSpPr>
+          <p:nvPr>
+            <p:ph type="sldNum" sz="quarter" idx="10"/>
+          </p:nvPr>
+        </p:nvSpPr>
+        <p:spPr/>
+        <p:txBody>
+          <a:bodyPr/>
+          <a:lstStyle/>
+          <a:p>
+            <a:fld id="{B274066A-D326-41ED-8B87-404DACE06210}" type="slidenum">
+              <a:rPr lang="de-DE" smtClean="0"/>
+              <a:t>2</a:t>
+            </a:fld>
+            <a:endParaRPr lang="de-DE"/>
+          </a:p>
+        </p:txBody>
+      </p:sp>
+    </p:spTree>
+    <p:extLst>
+      <p:ext uri="{BB962C8B-B14F-4D97-AF65-F5344CB8AC3E}">
+        <p14:creationId xmlns:p14="http://schemas.microsoft.com/office/powerpoint/2010/main" val="2947589179"/>
+      </p:ext>
+    </p:extLst>
+  </p:cSld>
+  <p:clrMapOvr>
+    <a:masterClrMapping/>
+  </p:clrMapOvr>
+</p:notes>
+</file>
+
+<file path=ppt/notesSlides/notesSlide3.xml><?xml version="1.0" encoding="utf-8"?>
+<p:notes xmlns:a="http://schemas.openxmlformats.org/drawingml/2006/main" xmlns:r="http://schemas.openxmlformats.org/officeDocument/2006/relationships" xmlns:p="http://schemas.openxmlformats.org/presentationml/2006/main">
+  <p:cSld>
+    <p:spTree>
+      <p:nvGrpSpPr>
+        <p:cNvPr id="1" name=""/>
+        <p:cNvGrpSpPr/>
+        <p:nvPr/>
+      </p:nvGrpSpPr>
+      <p:grpSpPr>
+        <a:xfrm>
+          <a:off x="0" y="0"/>
+          <a:ext cx="0" cy="0"/>
+          <a:chOff x="0" y="0"/>
+          <a:chExt cx="0" cy="0"/>
+        </a:xfrm>
+      </p:grpSpPr>
+      <p:sp>
+        <p:nvSpPr>
+          <p:cNvPr id="2" name="Образ слайда 1"/>
+          <p:cNvSpPr>
+            <a:spLocks noGrp="1" noRot="1" noChangeAspect="1"/>
+          </p:cNvSpPr>
+          <p:nvPr>
+            <p:ph type="sldImg"/>
+          </p:nvPr>
+        </p:nvSpPr>
+        <p:spPr/>
+      </p:sp>
+      <p:sp>
+        <p:nvSpPr>
+          <p:cNvPr id="3" name="Заметки 2"/>
+          <p:cNvSpPr>
+            <a:spLocks noGrp="1"/>
+          </p:cNvSpPr>
+          <p:nvPr>
+            <p:ph type="body" idx="1"/>
+          </p:nvPr>
+        </p:nvSpPr>
+        <p:spPr/>
+        <p:txBody>
+          <a:bodyPr/>
+          <a:lstStyle/>
+          <a:p>
+            <a:r>
+              <a:rPr lang="en-US" dirty="0" smtClean="0"/>
+              <a:t>This is a view where you can show</a:t>
+            </a:r>
+            <a:r>
+              <a:rPr lang="en-US" baseline="0" dirty="0" smtClean="0"/>
+              <a:t> and analyze measurements received from the phone.</a:t>
+            </a:r>
+          </a:p>
+          <a:p>
+            <a:endParaRPr lang="en-US" baseline="0" dirty="0" smtClean="0"/>
+          </a:p>
+          <a:p>
+            <a:pPr marL="171450" indent="-171450">
+              <a:buFontTx/>
+              <a:buChar char="-"/>
+            </a:pPr>
+            <a:r>
+              <a:rPr lang="en-US" baseline="0" dirty="0" smtClean="0"/>
+              <a:t>Control Menu</a:t>
+            </a:r>
+          </a:p>
+          <a:p>
+            <a:pPr marL="171450" indent="-171450">
+              <a:buFontTx/>
+              <a:buChar char="-"/>
+            </a:pPr>
+            <a:r>
+              <a:rPr lang="en-US" baseline="0" dirty="0" smtClean="0"/>
+              <a:t>Database Statistics</a:t>
+            </a:r>
+          </a:p>
+          <a:p>
+            <a:pPr marL="171450" indent="-171450">
+              <a:buFontTx/>
+              <a:buChar char="-"/>
+            </a:pPr>
+            <a:r>
+              <a:rPr lang="en-US" baseline="0" dirty="0" smtClean="0"/>
+              <a:t>Graphical View</a:t>
+            </a:r>
+          </a:p>
+          <a:p>
+            <a:pPr marL="628650" lvl="1" indent="-171450">
+              <a:buFontTx/>
+              <a:buChar char="-"/>
+            </a:pPr>
+            <a:r>
+              <a:rPr lang="en-US" baseline="0" dirty="0" smtClean="0"/>
+              <a:t>Signal Changes</a:t>
+            </a:r>
+          </a:p>
+          <a:p>
+            <a:pPr marL="628650" lvl="1" indent="-171450">
+              <a:buFontTx/>
+              <a:buChar char="-"/>
+            </a:pPr>
+            <a:r>
+              <a:rPr lang="en-US" baseline="0" dirty="0" smtClean="0"/>
+              <a:t>Signal </a:t>
+            </a:r>
+            <a:r>
+              <a:rPr lang="en-US" baseline="0" dirty="0" err="1" smtClean="0"/>
+              <a:t>Heatmap</a:t>
+            </a:r>
+            <a:endParaRPr lang="en-US" baseline="0" dirty="0" smtClean="0"/>
+          </a:p>
+          <a:p>
+            <a:pPr marL="628650" lvl="1" indent="-171450">
+              <a:buFontTx/>
+              <a:buChar char="-"/>
+            </a:pPr>
+            <a:r>
+              <a:rPr lang="en-US" baseline="0" dirty="0" smtClean="0"/>
+              <a:t>Client Measurement Technology</a:t>
+            </a:r>
+          </a:p>
+          <a:p>
+            <a:pPr marL="628650" lvl="1" indent="-171450">
+              <a:buFontTx/>
+              <a:buChar char="-"/>
+            </a:pPr>
+            <a:r>
+              <a:rPr lang="en-US" baseline="0" dirty="0" smtClean="0"/>
+              <a:t>Link throughput Measurements</a:t>
+            </a:r>
+            <a:endParaRPr lang="en-US" dirty="0"/>
+          </a:p>
+        </p:txBody>
+      </p:sp>
+      <p:sp>
+        <p:nvSpPr>
+          <p:cNvPr id="4" name="Номер слайда 3"/>
+          <p:cNvSpPr>
+            <a:spLocks noGrp="1"/>
+          </p:cNvSpPr>
+          <p:nvPr>
+            <p:ph type="sldNum" sz="quarter" idx="10"/>
+          </p:nvPr>
+        </p:nvSpPr>
+        <p:spPr/>
+        <p:txBody>
+          <a:bodyPr/>
+          <a:lstStyle/>
+          <a:p>
+            <a:fld id="{B274066A-D326-41ED-8B87-404DACE06210}" type="slidenum">
+              <a:rPr lang="de-DE" smtClean="0"/>
+              <a:t>3</a:t>
+            </a:fld>
+            <a:endParaRPr lang="de-DE"/>
+          </a:p>
+        </p:txBody>
+      </p:sp>
+    </p:spTree>
+    <p:extLst>
+      <p:ext uri="{BB962C8B-B14F-4D97-AF65-F5344CB8AC3E}">
+        <p14:creationId xmlns:p14="http://schemas.microsoft.com/office/powerpoint/2010/main" val="51456825"/>
+      </p:ext>
+    </p:extLst>
+  </p:cSld>
+  <p:clrMapOvr>
+    <a:masterClrMapping/>
+  </p:clrMapOvr>
+</p:notes>
+</file>
+
+<file path=ppt/notesSlides/notesSlide4.xml><?xml version="1.0" encoding="utf-8"?>
+<p:notes xmlns:a="http://schemas.openxmlformats.org/drawingml/2006/main" xmlns:r="http://schemas.openxmlformats.org/officeDocument/2006/relationships" xmlns:p="http://schemas.openxmlformats.org/presentationml/2006/main">
+  <p:cSld>
+    <p:spTree>
+      <p:nvGrpSpPr>
+        <p:cNvPr id="1" name=""/>
+        <p:cNvGrpSpPr/>
+        <p:nvPr/>
+      </p:nvGrpSpPr>
+      <p:grpSpPr>
+        <a:xfrm>
+          <a:off x="0" y="0"/>
+          <a:ext cx="0" cy="0"/>
+          <a:chOff x="0" y="0"/>
+          <a:chExt cx="0" cy="0"/>
+        </a:xfrm>
+      </p:grpSpPr>
+      <p:sp>
+        <p:nvSpPr>
+          <p:cNvPr id="2" name="Образ слайда 1"/>
+          <p:cNvSpPr>
+            <a:spLocks noGrp="1" noRot="1" noChangeAspect="1"/>
+          </p:cNvSpPr>
+          <p:nvPr>
+            <p:ph type="sldImg"/>
+          </p:nvPr>
+        </p:nvSpPr>
+        <p:spPr/>
+      </p:sp>
+      <p:sp>
+        <p:nvSpPr>
+          <p:cNvPr id="3" name="Заметки 2"/>
+          <p:cNvSpPr>
+            <a:spLocks noGrp="1"/>
+          </p:cNvSpPr>
+          <p:nvPr>
+            <p:ph type="body" idx="1"/>
+          </p:nvPr>
+        </p:nvSpPr>
+        <p:spPr/>
+        <p:txBody>
+          <a:bodyPr/>
+          <a:lstStyle/>
+          <a:p>
+            <a:r>
+              <a:rPr lang="en-US" dirty="0" smtClean="0"/>
+              <a:t>This is another</a:t>
+            </a:r>
+            <a:r>
+              <a:rPr lang="en-US" baseline="0" dirty="0" smtClean="0"/>
+              <a:t> view of </a:t>
+            </a:r>
+            <a:r>
+              <a:rPr lang="en-US" baseline="0" dirty="0" err="1" smtClean="0"/>
+              <a:t>GPS_Frontend</a:t>
+            </a:r>
+            <a:r>
+              <a:rPr lang="en-US" baseline="0" dirty="0" smtClean="0"/>
+              <a:t> where you work with placement </a:t>
+            </a:r>
+            <a:r>
+              <a:rPr lang="en-US" baseline="0" dirty="0" err="1" smtClean="0"/>
+              <a:t>opltimication</a:t>
+            </a:r>
+            <a:r>
+              <a:rPr lang="en-US" baseline="0" dirty="0" smtClean="0"/>
+              <a:t> algorithms</a:t>
+            </a:r>
+          </a:p>
+          <a:p>
+            <a:endParaRPr lang="en-US" baseline="0" dirty="0" smtClean="0"/>
+          </a:p>
+          <a:p>
+            <a:pPr marL="171450" indent="-171450">
+              <a:buFontTx/>
+              <a:buChar char="-"/>
+            </a:pPr>
+            <a:r>
+              <a:rPr lang="en-US" baseline="0" dirty="0" smtClean="0"/>
+              <a:t>Control Menu</a:t>
+            </a:r>
+          </a:p>
+          <a:p>
+            <a:pPr marL="171450" indent="-171450">
+              <a:buFontTx/>
+              <a:buChar char="-"/>
+            </a:pPr>
+            <a:r>
+              <a:rPr lang="en-US" baseline="0" dirty="0" smtClean="0"/>
+              <a:t>Estimation Menu</a:t>
+            </a:r>
+          </a:p>
+          <a:p>
+            <a:pPr marL="171450" indent="-171450">
+              <a:buFontTx/>
+              <a:buChar char="-"/>
+            </a:pPr>
+            <a:r>
+              <a:rPr lang="en-US" baseline="0" dirty="0" smtClean="0"/>
+              <a:t>Available Estimation Results</a:t>
+            </a:r>
+            <a:endParaRPr lang="en-US" dirty="0"/>
+          </a:p>
+        </p:txBody>
+      </p:sp>
+      <p:sp>
+        <p:nvSpPr>
+          <p:cNvPr id="4" name="Номер слайда 3"/>
+          <p:cNvSpPr>
+            <a:spLocks noGrp="1"/>
+          </p:cNvSpPr>
+          <p:nvPr>
+            <p:ph type="sldNum" sz="quarter" idx="10"/>
+          </p:nvPr>
+        </p:nvSpPr>
+        <p:spPr/>
+        <p:txBody>
+          <a:bodyPr/>
+          <a:lstStyle/>
+          <a:p>
+            <a:fld id="{B274066A-D326-41ED-8B87-404DACE06210}" type="slidenum">
+              <a:rPr lang="de-DE" smtClean="0"/>
+              <a:t>4</a:t>
+            </a:fld>
+            <a:endParaRPr lang="de-DE"/>
+          </a:p>
+        </p:txBody>
+      </p:sp>
+    </p:spTree>
+    <p:extLst>
+      <p:ext uri="{BB962C8B-B14F-4D97-AF65-F5344CB8AC3E}">
+        <p14:creationId xmlns:p14="http://schemas.microsoft.com/office/powerpoint/2010/main" val="652845101"/>
+      </p:ext>
+    </p:extLst>
+  </p:cSld>
+  <p:clrMapOvr>
+    <a:masterClrMapping/>
+  </p:clrMapOvr>
+</p:notes>
+</file>
+
+<file path=ppt/notesSlides/notesSlide5.xml><?xml version="1.0" encoding="utf-8"?>
+<p:notes xmlns:a="http://schemas.openxmlformats.org/drawingml/2006/main" xmlns:r="http://schemas.openxmlformats.org/officeDocument/2006/relationships" xmlns:p="http://schemas.openxmlformats.org/presentationml/2006/main">
+  <p:cSld>
+    <p:spTree>
+      <p:nvGrpSpPr>
+        <p:cNvPr id="1" name=""/>
+        <p:cNvGrpSpPr/>
+        <p:nvPr/>
+      </p:nvGrpSpPr>
+      <p:grpSpPr>
+        <a:xfrm>
+          <a:off x="0" y="0"/>
+          <a:ext cx="0" cy="0"/>
+          <a:chOff x="0" y="0"/>
+          <a:chExt cx="0" cy="0"/>
+        </a:xfrm>
+      </p:grpSpPr>
+      <p:sp>
+        <p:nvSpPr>
+          <p:cNvPr id="2" name="Образ слайда 1"/>
+          <p:cNvSpPr>
+            <a:spLocks noGrp="1" noRot="1" noChangeAspect="1"/>
+          </p:cNvSpPr>
+          <p:nvPr>
+            <p:ph type="sldImg"/>
+          </p:nvPr>
+        </p:nvSpPr>
+        <p:spPr/>
+      </p:sp>
+      <p:sp>
+        <p:nvSpPr>
+          <p:cNvPr id="3" name="Заметки 2"/>
+          <p:cNvSpPr>
+            <a:spLocks noGrp="1"/>
+          </p:cNvSpPr>
+          <p:nvPr>
+            <p:ph type="body" idx="1"/>
+          </p:nvPr>
+        </p:nvSpPr>
+        <p:spPr/>
+        <p:txBody>
+          <a:bodyPr/>
+          <a:lstStyle/>
+          <a:p>
+            <a:r>
+              <a:rPr lang="en-US" dirty="0" smtClean="0"/>
+              <a:t>Then we are going to discuss</a:t>
+            </a:r>
+            <a:r>
+              <a:rPr lang="en-US" baseline="0" dirty="0" smtClean="0"/>
+              <a:t> our backend part called </a:t>
+            </a:r>
+            <a:r>
+              <a:rPr lang="en-US" baseline="0" dirty="0" err="1" smtClean="0"/>
+              <a:t>GPS_Tracker</a:t>
+            </a:r>
+            <a:r>
+              <a:rPr lang="en-US" baseline="0" dirty="0" smtClean="0"/>
+              <a:t>.</a:t>
+            </a:r>
+          </a:p>
+          <a:p>
+            <a:endParaRPr lang="en-US" baseline="0" dirty="0" smtClean="0"/>
+          </a:p>
+          <a:p>
+            <a:r>
+              <a:rPr lang="en-US" sz="1200" b="0" kern="1200" dirty="0" smtClean="0">
+                <a:solidFill>
+                  <a:schemeClr val="tx1"/>
+                </a:solidFill>
+                <a:effectLst/>
+                <a:latin typeface="+mn-lt"/>
+                <a:ea typeface="+mn-ea"/>
+                <a:cs typeface="+mn-cs"/>
+              </a:rPr>
+              <a:t>This</a:t>
+            </a:r>
+            <a:r>
+              <a:rPr lang="en-US" sz="1200" b="0" kern="1200" baseline="0" dirty="0" smtClean="0">
+                <a:solidFill>
+                  <a:schemeClr val="tx1"/>
+                </a:solidFill>
+                <a:effectLst/>
+                <a:latin typeface="+mn-lt"/>
+                <a:ea typeface="+mn-ea"/>
+                <a:cs typeface="+mn-cs"/>
+              </a:rPr>
+              <a:t> </a:t>
+            </a:r>
+            <a:r>
+              <a:rPr lang="en-US" sz="1200" b="0" kern="1200" dirty="0" smtClean="0">
+                <a:solidFill>
+                  <a:schemeClr val="tx1"/>
+                </a:solidFill>
+                <a:effectLst/>
+                <a:latin typeface="+mn-lt"/>
+                <a:ea typeface="+mn-ea"/>
+                <a:cs typeface="+mn-cs"/>
+              </a:rPr>
+              <a:t>is</a:t>
+            </a:r>
+            <a:r>
+              <a:rPr lang="en-US" sz="1200" b="0" kern="1200" baseline="0" dirty="0" smtClean="0">
+                <a:solidFill>
+                  <a:schemeClr val="tx1"/>
+                </a:solidFill>
+                <a:effectLst/>
+                <a:latin typeface="+mn-lt"/>
+                <a:ea typeface="+mn-ea"/>
+                <a:cs typeface="+mn-cs"/>
+              </a:rPr>
+              <a:t> </a:t>
+            </a:r>
+            <a:r>
+              <a:rPr lang="en-US" sz="1200" b="0" kern="1200" dirty="0" smtClean="0">
+                <a:solidFill>
+                  <a:schemeClr val="tx1"/>
+                </a:solidFill>
+                <a:effectLst/>
+                <a:latin typeface="+mn-lt"/>
+                <a:ea typeface="+mn-ea"/>
+                <a:cs typeface="+mn-cs"/>
+              </a:rPr>
+              <a:t> set of backend programs intended to serve user requests, process incoming messages from </a:t>
+            </a:r>
+            <a:r>
+              <a:rPr lang="en-US" sz="1200" b="0" kern="1200" dirty="0" err="1" smtClean="0">
+                <a:solidFill>
+                  <a:schemeClr val="tx1"/>
+                </a:solidFill>
+                <a:effectLst/>
+                <a:latin typeface="+mn-lt"/>
+                <a:ea typeface="+mn-ea"/>
+                <a:cs typeface="+mn-cs"/>
+              </a:rPr>
+              <a:t>GPS_Androi</a:t>
+            </a:r>
+            <a:r>
+              <a:rPr lang="en-US" sz="1200" b="0" kern="1200" dirty="0" smtClean="0">
+                <a:solidFill>
+                  <a:schemeClr val="tx1"/>
+                </a:solidFill>
+                <a:effectLst/>
+                <a:latin typeface="+mn-lt"/>
+                <a:ea typeface="+mn-ea"/>
+                <a:cs typeface="+mn-cs"/>
+              </a:rPr>
+              <a:t> and perform optimization tasks.</a:t>
+            </a:r>
+          </a:p>
+          <a:p>
+            <a:endParaRPr lang="en-US" sz="1200" b="0" kern="1200" dirty="0" smtClean="0">
+              <a:solidFill>
+                <a:schemeClr val="tx1"/>
+              </a:solidFill>
+              <a:effectLst/>
+              <a:latin typeface="+mn-lt"/>
+              <a:ea typeface="+mn-ea"/>
+              <a:cs typeface="+mn-cs"/>
+            </a:endParaRPr>
+          </a:p>
+          <a:p>
+            <a:r>
+              <a:rPr lang="en-US" sz="1200" b="0" kern="1200" dirty="0" smtClean="0">
+                <a:solidFill>
+                  <a:schemeClr val="tx1"/>
+                </a:solidFill>
+                <a:effectLst/>
+                <a:latin typeface="+mn-lt"/>
+                <a:ea typeface="+mn-ea"/>
+                <a:cs typeface="+mn-cs"/>
+              </a:rPr>
+              <a:t>The GPS Tracker is implemented in Python language. This is a dynamic interpreting language. That is known the performance is not so perfect compared to</a:t>
+            </a:r>
+          </a:p>
+          <a:p>
+            <a:r>
+              <a:rPr lang="en-US" sz="1200" b="0" kern="1200" dirty="0" smtClean="0">
+                <a:solidFill>
+                  <a:schemeClr val="tx1"/>
+                </a:solidFill>
+                <a:effectLst/>
+                <a:latin typeface="+mn-lt"/>
+                <a:ea typeface="+mn-ea"/>
+                <a:cs typeface="+mn-cs"/>
+              </a:rPr>
+              <a:t>static compiled languages, but it has higher changeability property.</a:t>
+            </a:r>
+          </a:p>
+          <a:p>
+            <a:endParaRPr lang="en-US" sz="1200" b="0" kern="1200" dirty="0">
+              <a:solidFill>
+                <a:schemeClr val="tx1"/>
+              </a:solidFill>
+              <a:effectLst/>
+              <a:latin typeface="+mn-lt"/>
+              <a:ea typeface="+mn-ea"/>
+              <a:cs typeface="+mn-cs"/>
+            </a:endParaRPr>
+          </a:p>
+        </p:txBody>
+      </p:sp>
+      <p:sp>
+        <p:nvSpPr>
+          <p:cNvPr id="4" name="Номер слайда 3"/>
+          <p:cNvSpPr>
+            <a:spLocks noGrp="1"/>
+          </p:cNvSpPr>
+          <p:nvPr>
+            <p:ph type="sldNum" sz="quarter" idx="10"/>
+          </p:nvPr>
+        </p:nvSpPr>
+        <p:spPr/>
+        <p:txBody>
+          <a:bodyPr/>
+          <a:lstStyle/>
+          <a:p>
+            <a:fld id="{B274066A-D326-41ED-8B87-404DACE06210}" type="slidenum">
+              <a:rPr lang="de-DE" smtClean="0"/>
+              <a:t>5</a:t>
+            </a:fld>
+            <a:endParaRPr lang="de-DE"/>
+          </a:p>
+        </p:txBody>
+      </p:sp>
+    </p:spTree>
+    <p:extLst>
+      <p:ext uri="{BB962C8B-B14F-4D97-AF65-F5344CB8AC3E}">
+        <p14:creationId xmlns:p14="http://schemas.microsoft.com/office/powerpoint/2010/main" val="2599605137"/>
+      </p:ext>
+    </p:extLst>
+  </p:cSld>
+  <p:clrMapOvr>
+    <a:masterClrMapping/>
+  </p:clrMapOvr>
+</p:notes>
+</file>
+
+<file path=ppt/notesSlides/notesSlide6.xml><?xml version="1.0" encoding="utf-8"?>
+<p:notes xmlns:a="http://schemas.openxmlformats.org/drawingml/2006/main" xmlns:r="http://schemas.openxmlformats.org/officeDocument/2006/relationships" xmlns:p="http://schemas.openxmlformats.org/presentationml/2006/main">
+  <p:cSld>
+    <p:spTree>
+      <p:nvGrpSpPr>
+        <p:cNvPr id="1" name=""/>
+        <p:cNvGrpSpPr/>
+        <p:nvPr/>
+      </p:nvGrpSpPr>
+      <p:grpSpPr>
+        <a:xfrm>
+          <a:off x="0" y="0"/>
+          <a:ext cx="0" cy="0"/>
+          <a:chOff x="0" y="0"/>
+          <a:chExt cx="0" cy="0"/>
+        </a:xfrm>
+      </p:grpSpPr>
+      <p:sp>
+        <p:nvSpPr>
+          <p:cNvPr id="2" name="Образ слайда 1"/>
+          <p:cNvSpPr>
+            <a:spLocks noGrp="1" noRot="1" noChangeAspect="1"/>
+          </p:cNvSpPr>
+          <p:nvPr>
+            <p:ph type="sldImg"/>
+          </p:nvPr>
+        </p:nvSpPr>
+        <p:spPr/>
+      </p:sp>
+      <p:sp>
+        <p:nvSpPr>
+          <p:cNvPr id="3" name="Заметки 2"/>
+          <p:cNvSpPr>
+            <a:spLocks noGrp="1"/>
+          </p:cNvSpPr>
+          <p:nvPr>
+            <p:ph type="body" idx="1"/>
+          </p:nvPr>
+        </p:nvSpPr>
+        <p:spPr/>
+        <p:txBody>
+          <a:bodyPr/>
+          <a:lstStyle/>
+          <a:p>
+            <a:r>
+              <a:rPr lang="en-US" dirty="0" smtClean="0"/>
+              <a:t>This s component diagram of </a:t>
+            </a:r>
+            <a:r>
+              <a:rPr lang="en-US" dirty="0" err="1" smtClean="0"/>
+              <a:t>GPS_Tracker</a:t>
+            </a:r>
+            <a:endParaRPr lang="en-US" dirty="0" smtClean="0"/>
+          </a:p>
+          <a:p>
+            <a:endParaRPr lang="en-US" dirty="0" smtClean="0"/>
+          </a:p>
+          <a:p>
+            <a:r>
+              <a:rPr lang="en-US" dirty="0" smtClean="0"/>
+              <a:t>I</a:t>
+            </a:r>
+            <a:r>
+              <a:rPr lang="en-US" baseline="0" dirty="0" smtClean="0"/>
+              <a:t> would like to point out two subsystem</a:t>
+            </a:r>
+          </a:p>
+          <a:p>
+            <a:endParaRPr lang="en-US" baseline="0" dirty="0" smtClean="0"/>
+          </a:p>
+          <a:p>
+            <a:pPr marL="171450" indent="-171450">
+              <a:buFontTx/>
+              <a:buChar char="-"/>
+            </a:pPr>
+            <a:r>
+              <a:rPr lang="en-US" baseline="0" dirty="0" smtClean="0"/>
+              <a:t>Processing Subsystem</a:t>
+            </a:r>
+          </a:p>
+          <a:p>
+            <a:pPr marL="628650" lvl="1" indent="-171450">
+              <a:buFontTx/>
+              <a:buChar char="-"/>
+            </a:pPr>
+            <a:r>
+              <a:rPr lang="en-US" baseline="0" dirty="0" smtClean="0"/>
+              <a:t>FTP</a:t>
+            </a:r>
+          </a:p>
+          <a:p>
+            <a:pPr marL="628650" lvl="1" indent="-171450">
+              <a:buFontTx/>
+              <a:buChar char="-"/>
+            </a:pPr>
+            <a:r>
+              <a:rPr lang="en-US" baseline="0" dirty="0" smtClean="0"/>
+              <a:t>MQTT (with middleware) or </a:t>
+            </a:r>
+            <a:r>
+              <a:rPr lang="en-US" baseline="0" dirty="0" err="1" smtClean="0"/>
+              <a:t>DataBackend</a:t>
+            </a:r>
+            <a:endParaRPr lang="en-US" baseline="0" dirty="0" smtClean="0"/>
+          </a:p>
+          <a:p>
+            <a:pPr marL="171450" indent="-171450">
+              <a:buFontTx/>
+              <a:buChar char="-"/>
+            </a:pPr>
+            <a:r>
+              <a:rPr lang="en-US" baseline="0" dirty="0" smtClean="0"/>
+              <a:t>Storage Subsystem</a:t>
+            </a:r>
+          </a:p>
+          <a:p>
+            <a:pPr marL="628650" lvl="1" indent="-171450">
+              <a:buFontTx/>
+              <a:buChar char="-"/>
+            </a:pPr>
+            <a:r>
+              <a:rPr lang="en-US" baseline="0" dirty="0" smtClean="0"/>
+              <a:t>Interface</a:t>
+            </a:r>
+          </a:p>
+          <a:p>
+            <a:pPr marL="628650" lvl="1" indent="-171450">
+              <a:buFontTx/>
+              <a:buChar char="-"/>
+            </a:pPr>
+            <a:r>
+              <a:rPr lang="en-US" baseline="0" dirty="0" smtClean="0"/>
+              <a:t>MongoDB</a:t>
+            </a:r>
+            <a:endParaRPr lang="en-US" dirty="0"/>
+          </a:p>
+        </p:txBody>
+      </p:sp>
+      <p:sp>
+        <p:nvSpPr>
+          <p:cNvPr id="4" name="Номер слайда 3"/>
+          <p:cNvSpPr>
+            <a:spLocks noGrp="1"/>
+          </p:cNvSpPr>
+          <p:nvPr>
+            <p:ph type="sldNum" sz="quarter" idx="10"/>
+          </p:nvPr>
+        </p:nvSpPr>
+        <p:spPr/>
+        <p:txBody>
+          <a:bodyPr/>
+          <a:lstStyle/>
+          <a:p>
+            <a:fld id="{B274066A-D326-41ED-8B87-404DACE06210}" type="slidenum">
+              <a:rPr lang="de-DE" smtClean="0"/>
+              <a:t>6</a:t>
+            </a:fld>
+            <a:endParaRPr lang="de-DE"/>
+          </a:p>
+        </p:txBody>
+      </p:sp>
+    </p:spTree>
+    <p:extLst>
+      <p:ext uri="{BB962C8B-B14F-4D97-AF65-F5344CB8AC3E}">
+        <p14:creationId xmlns:p14="http://schemas.microsoft.com/office/powerpoint/2010/main" val="477537368"/>
+      </p:ext>
+    </p:extLst>
+  </p:cSld>
+  <p:clrMapOvr>
+    <a:masterClrMapping/>
+  </p:clrMapOvr>
+</p:notes>
+</file>
+
+<file path=ppt/notesSlides/notesSlide7.xml><?xml version="1.0" encoding="utf-8"?>
+<p:notes xmlns:a="http://schemas.openxmlformats.org/drawingml/2006/main" xmlns:r="http://schemas.openxmlformats.org/officeDocument/2006/relationships" xmlns:p="http://schemas.openxmlformats.org/presentationml/2006/main">
+  <p:cSld>
+    <p:spTree>
+      <p:nvGrpSpPr>
+        <p:cNvPr id="1" name=""/>
+        <p:cNvGrpSpPr/>
+        <p:nvPr/>
+      </p:nvGrpSpPr>
+      <p:grpSpPr>
+        <a:xfrm>
+          <a:off x="0" y="0"/>
+          <a:ext cx="0" cy="0"/>
+          <a:chOff x="0" y="0"/>
+          <a:chExt cx="0" cy="0"/>
+        </a:xfrm>
+      </p:grpSpPr>
+      <p:sp>
+        <p:nvSpPr>
+          <p:cNvPr id="2" name="Образ слайда 1"/>
+          <p:cNvSpPr>
+            <a:spLocks noGrp="1" noRot="1" noChangeAspect="1"/>
+          </p:cNvSpPr>
+          <p:nvPr>
+            <p:ph type="sldImg"/>
+          </p:nvPr>
+        </p:nvSpPr>
+        <p:spPr/>
+      </p:sp>
+      <p:sp>
+        <p:nvSpPr>
+          <p:cNvPr id="3" name="Заметки 2"/>
+          <p:cNvSpPr>
+            <a:spLocks noGrp="1"/>
+          </p:cNvSpPr>
+          <p:nvPr>
+            <p:ph type="body" idx="1"/>
+          </p:nvPr>
+        </p:nvSpPr>
+        <p:spPr/>
+        <p:txBody>
+          <a:bodyPr/>
+          <a:lstStyle/>
+          <a:p>
+            <a:r>
+              <a:rPr lang="en-US" dirty="0" smtClean="0"/>
+              <a:t>Speaking</a:t>
+            </a:r>
+            <a:r>
+              <a:rPr lang="en-US" baseline="0" dirty="0" smtClean="0"/>
+              <a:t> about Worker design pattern, it provides useful architecture:</a:t>
+            </a:r>
+          </a:p>
+          <a:p>
+            <a:endParaRPr lang="en-US" baseline="0" dirty="0" smtClean="0"/>
+          </a:p>
+          <a:p>
+            <a:r>
+              <a:rPr lang="en-US" baseline="0" dirty="0" smtClean="0"/>
+              <a:t>-  Linear performance scaling</a:t>
+            </a:r>
+          </a:p>
+          <a:p>
+            <a:pPr marL="171450" indent="-171450">
+              <a:buFontTx/>
+              <a:buChar char="-"/>
+            </a:pPr>
+            <a:r>
+              <a:rPr lang="en-US" baseline="0" dirty="0" smtClean="0"/>
+              <a:t>Load balancing</a:t>
+            </a:r>
+          </a:p>
+          <a:p>
+            <a:pPr marL="171450" indent="-171450">
+              <a:buFontTx/>
+              <a:buChar char="-"/>
+            </a:pPr>
+            <a:r>
+              <a:rPr lang="en-US" baseline="0" dirty="0" smtClean="0"/>
+              <a:t>Fast feedback to users</a:t>
+            </a:r>
+            <a:endParaRPr lang="en-US" dirty="0"/>
+          </a:p>
+        </p:txBody>
+      </p:sp>
+      <p:sp>
+        <p:nvSpPr>
+          <p:cNvPr id="4" name="Номер слайда 3"/>
+          <p:cNvSpPr>
+            <a:spLocks noGrp="1"/>
+          </p:cNvSpPr>
+          <p:nvPr>
+            <p:ph type="sldNum" sz="quarter" idx="10"/>
+          </p:nvPr>
+        </p:nvSpPr>
+        <p:spPr/>
+        <p:txBody>
+          <a:bodyPr/>
+          <a:lstStyle/>
+          <a:p>
+            <a:fld id="{B274066A-D326-41ED-8B87-404DACE06210}" type="slidenum">
+              <a:rPr lang="de-DE" smtClean="0"/>
+              <a:t>7</a:t>
+            </a:fld>
+            <a:endParaRPr lang="de-DE"/>
+          </a:p>
+        </p:txBody>
+      </p:sp>
+    </p:spTree>
+    <p:extLst>
+      <p:ext uri="{BB962C8B-B14F-4D97-AF65-F5344CB8AC3E}">
+        <p14:creationId xmlns:p14="http://schemas.microsoft.com/office/powerpoint/2010/main" val="3602522874"/>
+      </p:ext>
+    </p:extLst>
+  </p:cSld>
+  <p:clrMapOvr>
+    <a:masterClrMapping/>
+  </p:clrMapOvr>
+</p:notes>
+</file>
+
+<file path=ppt/notesSlides/notesSlide8.xml><?xml version="1.0" encoding="utf-8"?>
+<p:notes xmlns:a="http://schemas.openxmlformats.org/drawingml/2006/main" xmlns:r="http://schemas.openxmlformats.org/officeDocument/2006/relationships" xmlns:p="http://schemas.openxmlformats.org/presentationml/2006/main">
+  <p:cSld>
+    <p:spTree>
+      <p:nvGrpSpPr>
+        <p:cNvPr id="1" name=""/>
+        <p:cNvGrpSpPr/>
+        <p:nvPr/>
+      </p:nvGrpSpPr>
+      <p:grpSpPr>
+        <a:xfrm>
+          <a:off x="0" y="0"/>
+          <a:ext cx="0" cy="0"/>
+          <a:chOff x="0" y="0"/>
+          <a:chExt cx="0" cy="0"/>
+        </a:xfrm>
+      </p:grpSpPr>
+      <p:sp>
+        <p:nvSpPr>
+          <p:cNvPr id="2" name="Образ слайда 1"/>
+          <p:cNvSpPr>
+            <a:spLocks noGrp="1" noRot="1" noChangeAspect="1"/>
+          </p:cNvSpPr>
+          <p:nvPr>
+            <p:ph type="sldImg"/>
+          </p:nvPr>
+        </p:nvSpPr>
+        <p:spPr/>
+      </p:sp>
+      <p:sp>
+        <p:nvSpPr>
+          <p:cNvPr id="3" name="Заметки 2"/>
+          <p:cNvSpPr>
+            <a:spLocks noGrp="1"/>
+          </p:cNvSpPr>
+          <p:nvPr>
+            <p:ph type="body" idx="1"/>
+          </p:nvPr>
+        </p:nvSpPr>
+        <p:spPr/>
+        <p:txBody>
+          <a:bodyPr/>
+          <a:lstStyle/>
+          <a:p>
+            <a:r>
+              <a:rPr lang="en-US" dirty="0" smtClean="0"/>
+              <a:t>Now I would like to discuss one of the most interesting features</a:t>
+            </a:r>
+            <a:r>
+              <a:rPr lang="en-US" baseline="0" dirty="0" smtClean="0"/>
+              <a:t> implemented in </a:t>
+            </a:r>
+            <a:r>
+              <a:rPr lang="en-US" baseline="0" dirty="0" err="1" smtClean="0"/>
+              <a:t>GPS_Tracker</a:t>
+            </a:r>
+            <a:r>
+              <a:rPr lang="en-US" baseline="0" dirty="0" smtClean="0"/>
+              <a:t>.</a:t>
+            </a:r>
+          </a:p>
+          <a:p>
+            <a:endParaRPr lang="en-US" baseline="0" dirty="0" smtClean="0"/>
+          </a:p>
+          <a:p>
+            <a:r>
+              <a:rPr lang="en-US" baseline="0" dirty="0" smtClean="0"/>
+              <a:t>Optimization tasks can take long to complete, and if we start optimization task in the same thread that serving a user request, it will hand the user until the task is done. To make UI responsible and interactive, we use Python Celery library to implement Worker pattern when performing an optimization task.</a:t>
+            </a:r>
+            <a:endParaRPr lang="en-US" dirty="0"/>
+          </a:p>
+        </p:txBody>
+      </p:sp>
+      <p:sp>
+        <p:nvSpPr>
+          <p:cNvPr id="4" name="Номер слайда 3"/>
+          <p:cNvSpPr>
+            <a:spLocks noGrp="1"/>
+          </p:cNvSpPr>
+          <p:nvPr>
+            <p:ph type="sldNum" sz="quarter" idx="10"/>
+          </p:nvPr>
+        </p:nvSpPr>
+        <p:spPr/>
+        <p:txBody>
+          <a:bodyPr/>
+          <a:lstStyle/>
+          <a:p>
+            <a:fld id="{B274066A-D326-41ED-8B87-404DACE06210}" type="slidenum">
+              <a:rPr lang="de-DE" smtClean="0"/>
+              <a:t>8</a:t>
+            </a:fld>
+            <a:endParaRPr lang="de-DE"/>
+          </a:p>
+        </p:txBody>
+      </p:sp>
+    </p:spTree>
+    <p:extLst>
+      <p:ext uri="{BB962C8B-B14F-4D97-AF65-F5344CB8AC3E}">
+        <p14:creationId xmlns:p14="http://schemas.microsoft.com/office/powerpoint/2010/main" val="3851236493"/>
+      </p:ext>
+    </p:extLst>
+  </p:cSld>
+  <p:clrMapOvr>
+    <a:masterClrMapping/>
+  </p:clrMapOvr>
+</p:notes>
+</file>
+
+<file path=ppt/notesSlides/notesSlide9.xml><?xml version="1.0" encoding="utf-8"?>
+<p:notes xmlns:a="http://schemas.openxmlformats.org/drawingml/2006/main" xmlns:r="http://schemas.openxmlformats.org/officeDocument/2006/relationships" xmlns:p="http://schemas.openxmlformats.org/presentationml/2006/main">
+  <p:cSld>
+    <p:spTree>
+      <p:nvGrpSpPr>
+        <p:cNvPr id="1" name=""/>
+        <p:cNvGrpSpPr/>
+        <p:nvPr/>
+      </p:nvGrpSpPr>
+      <p:grpSpPr>
+        <a:xfrm>
+          <a:off x="0" y="0"/>
+          <a:ext cx="0" cy="0"/>
+          <a:chOff x="0" y="0"/>
+          <a:chExt cx="0" cy="0"/>
+        </a:xfrm>
+      </p:grpSpPr>
+      <p:sp>
+        <p:nvSpPr>
+          <p:cNvPr id="2" name="Образ слайда 1"/>
+          <p:cNvSpPr>
+            <a:spLocks noGrp="1" noRot="1" noChangeAspect="1"/>
+          </p:cNvSpPr>
+          <p:nvPr>
+            <p:ph type="sldImg"/>
+          </p:nvPr>
+        </p:nvSpPr>
+        <p:spPr/>
+      </p:sp>
+      <p:sp>
+        <p:nvSpPr>
+          <p:cNvPr id="3" name="Заметки 2"/>
+          <p:cNvSpPr>
+            <a:spLocks noGrp="1"/>
+          </p:cNvSpPr>
+          <p:nvPr>
+            <p:ph type="body" idx="1"/>
+          </p:nvPr>
+        </p:nvSpPr>
+        <p:spPr/>
+        <p:txBody>
+          <a:bodyPr/>
+          <a:lstStyle/>
+          <a:p>
+            <a:r>
+              <a:rPr lang="en-US" dirty="0" smtClean="0"/>
+              <a:t>Another interesting thins is the deployment process of our framework.</a:t>
+            </a:r>
+          </a:p>
+          <a:p>
+            <a:endParaRPr lang="en-US" dirty="0" smtClean="0"/>
+          </a:p>
+          <a:p>
+            <a:r>
+              <a:rPr lang="en-US" dirty="0" smtClean="0"/>
+              <a:t>We provide</a:t>
+            </a:r>
+            <a:r>
+              <a:rPr lang="en-US" baseline="0" dirty="0" smtClean="0"/>
+              <a:t> flexible way to install and run the system – you can use real hardware that gives you the maximum performance, or you can use containerized environment.</a:t>
+            </a:r>
+          </a:p>
+          <a:p>
+            <a:endParaRPr lang="en-US" baseline="0" dirty="0" smtClean="0"/>
+          </a:p>
+          <a:p>
+            <a:r>
+              <a:rPr lang="en-US" baseline="0" dirty="0" smtClean="0"/>
+              <a:t>We provide already prepared virtual machine image, where software components are running in containers.</a:t>
+            </a:r>
+          </a:p>
+          <a:p>
+            <a:endParaRPr lang="en-US" baseline="0" dirty="0" smtClean="0"/>
+          </a:p>
+          <a:p>
+            <a:r>
+              <a:rPr lang="en-US" baseline="0" dirty="0" smtClean="0"/>
+              <a:t>There are pros and cons  when your add so many run-time abstraction, but nevertheless, advantages outweighs possible problems.</a:t>
+            </a:r>
+            <a:endParaRPr lang="en-US" dirty="0"/>
+          </a:p>
+        </p:txBody>
+      </p:sp>
+      <p:sp>
+        <p:nvSpPr>
+          <p:cNvPr id="4" name="Номер слайда 3"/>
+          <p:cNvSpPr>
+            <a:spLocks noGrp="1"/>
+          </p:cNvSpPr>
+          <p:nvPr>
+            <p:ph type="sldNum" sz="quarter" idx="10"/>
+          </p:nvPr>
+        </p:nvSpPr>
+        <p:spPr/>
+        <p:txBody>
+          <a:bodyPr/>
+          <a:lstStyle/>
+          <a:p>
+            <a:fld id="{B274066A-D326-41ED-8B87-404DACE06210}" type="slidenum">
+              <a:rPr lang="de-DE" smtClean="0"/>
+              <a:t>9</a:t>
+            </a:fld>
+            <a:endParaRPr lang="de-DE"/>
+          </a:p>
+        </p:txBody>
+      </p:sp>
+    </p:spTree>
+    <p:extLst>
+      <p:ext uri="{BB962C8B-B14F-4D97-AF65-F5344CB8AC3E}">
+        <p14:creationId xmlns:p14="http://schemas.microsoft.com/office/powerpoint/2010/main" val="316385511"/>
+      </p:ext>
+    </p:extLst>
+  </p:cSld>
+  <p:clrMapOvr>
+    <a:masterClrMapping/>
+  </p:clrMapOvr>
+</p:notes>
 </file>
 
 <file path=ppt/slideLayouts/slideLayout1.xml><?xml version="1.0" encoding="utf-8"?>
@@ -4233,7 +6037,7 @@
           <p:nvPr/>
         </p:nvPicPr>
         <p:blipFill>
-          <a:blip r:embed="rId2" cstate="print">
+          <a:blip r:embed="rId3" cstate="print">
             <a:extLst>
               <a:ext uri="{28A0092B-C50C-407E-A947-70E740481C1C}">
                 <a14:useLocalDpi xmlns:a14="http://schemas.microsoft.com/office/drawing/2010/main" val="0"/>
@@ -4389,7 +6193,7 @@
           </p:nvPr>
         </p:nvPicPr>
         <p:blipFill>
-          <a:blip r:embed="rId2">
+          <a:blip r:embed="rId3">
             <a:extLst>
               <a:ext uri="{28A0092B-C50C-407E-A947-70E740481C1C}">
                 <a14:useLocalDpi xmlns:a14="http://schemas.microsoft.com/office/drawing/2010/main" val="0"/>
@@ -4426,7 +6230,7 @@
         </p:spPr>
         <p:txBody>
           <a:bodyPr vert="horz" lIns="91440" tIns="45720" rIns="91440" bIns="45720" rtlCol="0" anchor="ctr">
-            <a:normAutofit/>
+            <a:normAutofit fontScale="85000" lnSpcReduction="10000"/>
           </a:bodyPr>
           <a:lstStyle>
             <a:lvl1pPr algn="ctr" defTabSz="914400" rtl="0" eaLnBrk="1" latinLnBrk="0" hangingPunct="1">
@@ -4447,7 +6251,11 @@
           <a:p>
             <a:r>
               <a:rPr lang="en-US" dirty="0" smtClean="0"/>
-              <a:t>Deployment Diagram</a:t>
+              <a:t>Deployment </a:t>
+            </a:r>
+            <a:r>
+              <a:rPr lang="en-US" dirty="0" smtClean="0"/>
+              <a:t>Diagram In Containers</a:t>
             </a:r>
             <a:endParaRPr lang="en-US" dirty="0"/>
           </a:p>
@@ -4556,10 +6364,6 @@
               <a:rPr lang="en-US" dirty="0"/>
               <a:t>, Sydney, NSW, 2014, pp. 21-30.</a:t>
             </a:r>
-            <a:r>
-              <a:rPr lang="en-US" dirty="0"/>
-              <a:t/>
-            </a:r>
             <a:br>
               <a:rPr lang="en-US" dirty="0"/>
             </a:br>
@@ -4825,7 +6629,7 @@
           <p:nvPr/>
         </p:nvPicPr>
         <p:blipFill>
-          <a:blip r:embed="rId2" cstate="print">
+          <a:blip r:embed="rId3" cstate="print">
             <a:extLst>
               <a:ext uri="{28A0092B-C50C-407E-A947-70E740481C1C}">
                 <a14:useLocalDpi xmlns:a14="http://schemas.microsoft.com/office/drawing/2010/main" val="0"/>
@@ -4855,7 +6659,7 @@
           <p:nvPr/>
         </p:nvPicPr>
         <p:blipFill>
-          <a:blip r:embed="rId3" cstate="print">
+          <a:blip r:embed="rId4" cstate="print">
             <a:extLst>
               <a:ext uri="{28A0092B-C50C-407E-A947-70E740481C1C}">
                 <a14:useLocalDpi xmlns:a14="http://schemas.microsoft.com/office/drawing/2010/main" val="0"/>
@@ -4885,7 +6689,7 @@
           <p:nvPr/>
         </p:nvPicPr>
         <p:blipFill>
-          <a:blip r:embed="rId4" cstate="print">
+          <a:blip r:embed="rId5" cstate="print">
             <a:extLst>
               <a:ext uri="{28A0092B-C50C-407E-A947-70E740481C1C}">
                 <a14:useLocalDpi xmlns:a14="http://schemas.microsoft.com/office/drawing/2010/main" val="0"/>
@@ -5074,7 +6878,7 @@
           <p:nvPr/>
         </p:nvPicPr>
         <p:blipFill>
-          <a:blip r:embed="rId2"/>
+          <a:blip r:embed="rId3"/>
           <a:stretch/>
         </p:blipFill>
         <p:spPr>
@@ -6026,7 +7830,7 @@
           </p:nvPr>
         </p:nvPicPr>
         <p:blipFill>
-          <a:blip r:embed="rId2">
+          <a:blip r:embed="rId3">
             <a:extLst>
               <a:ext uri="{28A0092B-C50C-407E-A947-70E740481C1C}">
                 <a14:useLocalDpi xmlns:a14="http://schemas.microsoft.com/office/drawing/2010/main" val="0"/>
@@ -6610,7 +8414,7 @@
           </p:nvPr>
         </p:nvPicPr>
         <p:blipFill>
-          <a:blip r:embed="rId2">
+          <a:blip r:embed="rId3">
             <a:extLst>
               <a:ext uri="{28A0092B-C50C-407E-A947-70E740481C1C}">
                 <a14:useLocalDpi xmlns:a14="http://schemas.microsoft.com/office/drawing/2010/main" val="0"/>
@@ -6795,7 +8599,7 @@
           </p:nvPr>
         </p:nvPicPr>
         <p:blipFill>
-          <a:blip r:embed="rId2">
+          <a:blip r:embed="rId3">
             <a:extLst>
               <a:ext uri="{28A0092B-C50C-407E-A947-70E740481C1C}">
                 <a14:useLocalDpi xmlns:a14="http://schemas.microsoft.com/office/drawing/2010/main" val="0"/>
@@ -7018,7 +8822,7 @@
           </p:nvPr>
         </p:nvPicPr>
         <p:blipFill>
-          <a:blip r:embed="rId2" cstate="print">
+          <a:blip r:embed="rId3" cstate="print">
             <a:extLst>
               <a:ext uri="{28A0092B-C50C-407E-A947-70E740481C1C}">
                 <a14:useLocalDpi xmlns:a14="http://schemas.microsoft.com/office/drawing/2010/main" val="0"/>
@@ -7245,7 +9049,7 @@
           <p:nvPr/>
         </p:nvPicPr>
         <p:blipFill>
-          <a:blip r:embed="rId2"/>
+          <a:blip r:embed="rId3"/>
           <a:stretch>
             <a:fillRect/>
           </a:stretch>

</xml_diff>